<commit_message>
AbsoluteParents 속성추가-> 초기 Loading부터 하나씩 추가하여 External system을 명확히 구분한다.(Root.Factory.Shop.Line.Station.Unit.Device...)
</commit_message>
<xml_diff>
--- a/DsDotNet/src/UnitTest/UnitTest.Model/ImportOfficeExample/Sample/Sub/Sub/Station.pptx
+++ b/DsDotNet/src/UnitTest/UnitTest.Model/ImportOfficeExample/Sample/Sub/Sub/Station.pptx
@@ -216,7 +216,7 @@
           <a:p>
             <a:fld id="{DD503887-5801-43A0-AEF9-041E8DDC2558}" type="datetimeFigureOut">
               <a:rPr lang="ko-KR" altLang="en-US" smtClean="0"/>
-              <a:t>2023-09-04</a:t>
+              <a:t>2023-09-05</a:t>
             </a:fld>
             <a:endParaRPr lang="ko-KR" altLang="en-US" dirty="0"/>
           </a:p>
@@ -393,7 +393,7 @@
           <a:p>
             <a:fld id="{95336A0E-57B1-4D4C-BD9B-2F72B5943464}" type="datetimeFigureOut">
               <a:rPr lang="ko-KR" altLang="en-US" smtClean="0"/>
-              <a:t>2023-09-04</a:t>
+              <a:t>2023-09-05</a:t>
             </a:fld>
             <a:endParaRPr lang="ko-KR" altLang="en-US" dirty="0"/>
           </a:p>
@@ -7534,7 +7534,7 @@
           </a:xfrm>
           <a:prstGeom prst="foldedCorner">
             <a:avLst>
-              <a:gd name="adj" fmla="val 25285"/>
+              <a:gd name="adj" fmla="val 0"/>
             </a:avLst>
           </a:prstGeom>
           <a:solidFill>
@@ -7607,7 +7607,7 @@
           </a:xfrm>
           <a:prstGeom prst="foldedCorner">
             <a:avLst>
-              <a:gd name="adj" fmla="val 19538"/>
+              <a:gd name="adj" fmla="val 0"/>
             </a:avLst>
           </a:prstGeom>
           <a:solidFill>

</xml_diff>